<commit_message>
ppt appearance fixes/ muscle align bug. Closes #3
</commit_message>
<xml_diff>
--- a/assets/template.pptx
+++ b/assets/template.pptx
@@ -10,7 +10,7 @@
   <p:sldIdLst>
     <p:sldId id="262" r:id="rId2"/>
     <p:sldId id="264" r:id="rId3"/>
-    <p:sldId id="268" r:id="rId4"/>
+    <p:sldId id="271" r:id="rId4"/>
     <p:sldId id="270" r:id="rId5"/>
     <p:sldId id="267" r:id="rId6"/>
   </p:sldIdLst>
@@ -204,7 +204,7 @@
           <a:p>
             <a:fld id="{3D35C63F-2105-BE4D-B527-2F529C382CE3}" type="datetimeFigureOut">
               <a:rPr lang="en-US" smtClean="0"/>
-              <a:t>8/28/25</a:t>
+              <a:t>9/4/25</a:t>
             </a:fld>
             <a:endParaRPr lang="en-US"/>
           </a:p>
@@ -618,7 +618,7 @@
           <a:p>
             <a:fld id="{B06752D5-78E2-A847-9C3B-189A3B26818D}" type="datetime1">
               <a:rPr lang="en-US" smtClean="0"/>
-              <a:t>8/28/25</a:t>
+              <a:t>9/4/25</a:t>
             </a:fld>
             <a:endParaRPr lang="en-US"/>
           </a:p>
@@ -734,7 +734,7 @@
           <a:p>
             <a:fld id="{388ACBCC-99E6-FE44-9ACC-953181C011A7}" type="datetime1">
               <a:rPr lang="en-US" smtClean="0"/>
-              <a:t>8/28/25</a:t>
+              <a:t>9/4/25</a:t>
             </a:fld>
             <a:endParaRPr lang="en-US"/>
           </a:p>
@@ -815,7 +815,7 @@
         </p:nvSpPr>
         <p:spPr>
           <a:xfrm>
-            <a:off x="396081" y="1005523"/>
+            <a:off x="152241" y="761683"/>
             <a:ext cx="6146959" cy="3139757"/>
           </a:xfrm>
         </p:spPr>
@@ -850,8 +850,8 @@
         </p:nvSpPr>
         <p:spPr>
           <a:xfrm>
-            <a:off x="6635114" y="1005523"/>
-            <a:ext cx="2743199" cy="4389437"/>
+            <a:off x="6299200" y="761683"/>
+            <a:ext cx="2743199" cy="3139757"/>
           </a:xfrm>
         </p:spPr>
         <p:txBody>
@@ -880,8 +880,38 @@
         </p:nvSpPr>
         <p:spPr>
           <a:xfrm>
-            <a:off x="9378313" y="1005523"/>
-            <a:ext cx="2743199" cy="4389437"/>
+            <a:off x="9042399" y="761683"/>
+            <a:ext cx="2778759" cy="3139758"/>
+          </a:xfrm>
+        </p:spPr>
+        <p:txBody>
+          <a:bodyPr/>
+          <a:lstStyle/>
+          <a:p>
+            <a:endParaRPr lang="en-US" dirty="0"/>
+          </a:p>
+        </p:txBody>
+      </p:sp>
+      <p:sp>
+        <p:nvSpPr>
+          <p:cNvPr id="10" name="Picture Placeholder 9">
+            <a:extLst>
+              <a:ext uri="{FF2B5EF4-FFF2-40B4-BE49-F238E27FC236}">
+                <a16:creationId xmlns:a16="http://schemas.microsoft.com/office/drawing/2014/main" id="{93AC2B28-4306-D423-6641-9D9C077E009C}"/>
+              </a:ext>
+            </a:extLst>
+          </p:cNvPr>
+          <p:cNvSpPr>
+            <a:spLocks noGrp="1"/>
+          </p:cNvSpPr>
+          <p:nvPr>
+            <p:ph type="pic" sz="quarter" idx="16"/>
+          </p:nvPr>
+        </p:nvSpPr>
+        <p:spPr>
+          <a:xfrm>
+            <a:off x="7924483" y="3559016"/>
+            <a:ext cx="2743199" cy="3139757"/>
           </a:xfrm>
         </p:spPr>
         <p:txBody>
@@ -1030,7 +1060,7 @@
           <a:p>
             <a:fld id="{8BE48B6B-F1AB-B84A-84D7-8652902395E6}" type="datetime1">
               <a:rPr lang="en-US" smtClean="0"/>
-              <a:t>8/28/25</a:t>
+              <a:t>9/4/25</a:t>
             </a:fld>
             <a:endParaRPr lang="en-US"/>
           </a:p>
@@ -1241,7 +1271,7 @@
           <a:p>
             <a:fld id="{DBB5A80F-23F3-D14B-A04A-2443AD3C8C1D}" type="datetime1">
               <a:rPr lang="en-US" smtClean="0"/>
-              <a:t>8/28/25</a:t>
+              <a:t>9/4/25</a:t>
             </a:fld>
             <a:endParaRPr lang="en-US"/>
           </a:p>
@@ -1442,7 +1472,7 @@
           <a:p>
             <a:fld id="{B4924098-444B-1F4A-964D-453B90BB09B8}" type="datetime1">
               <a:rPr lang="en-US" smtClean="0"/>
-              <a:t>8/28/25</a:t>
+              <a:t>9/4/25</a:t>
             </a:fld>
             <a:endParaRPr lang="en-US"/>
           </a:p>
@@ -1720,7 +1750,7 @@
           <a:p>
             <a:fld id="{64AA80EC-5C39-424E-BCDB-7253578D21E1}" type="datetime1">
               <a:rPr lang="en-US" smtClean="0"/>
-              <a:t>8/28/25</a:t>
+              <a:t>9/4/25</a:t>
             </a:fld>
             <a:endParaRPr lang="en-US"/>
           </a:p>
@@ -1988,7 +2018,7 @@
           <a:p>
             <a:fld id="{B62BE381-6531-BD4E-A14F-C7F7891665A3}" type="datetime1">
               <a:rPr lang="en-US" smtClean="0"/>
-              <a:t>8/28/25</a:t>
+              <a:t>9/4/25</a:t>
             </a:fld>
             <a:endParaRPr lang="en-US"/>
           </a:p>
@@ -2403,7 +2433,7 @@
           <a:p>
             <a:fld id="{EFF9B324-5E84-A143-AFFD-96C685045931}" type="datetime1">
               <a:rPr lang="en-US" smtClean="0"/>
-              <a:t>8/28/25</a:t>
+              <a:t>9/4/25</a:t>
             </a:fld>
             <a:endParaRPr lang="en-US"/>
           </a:p>
@@ -2547,7 +2577,7 @@
           <a:p>
             <a:fld id="{5E03C108-A023-064E-AD84-0599AE6A4C7B}" type="datetime1">
               <a:rPr lang="en-US" smtClean="0"/>
-              <a:t>8/28/25</a:t>
+              <a:t>9/4/25</a:t>
             </a:fld>
             <a:endParaRPr lang="en-US"/>
           </a:p>
@@ -2663,7 +2693,7 @@
           <a:p>
             <a:fld id="{2AD76E7B-7EA4-1F45-811E-6318427F47B0}" type="datetime1">
               <a:rPr lang="en-US" smtClean="0"/>
-              <a:t>8/28/25</a:t>
+              <a:t>9/4/25</a:t>
             </a:fld>
             <a:endParaRPr lang="en-US"/>
           </a:p>
@@ -3042,7 +3072,7 @@
           <a:p>
             <a:fld id="{CC6C6094-AAF0-DD4B-96E2-22EFC6CFCC8A}" type="datetime1">
               <a:rPr lang="en-US" smtClean="0"/>
-              <a:t>8/28/25</a:t>
+              <a:t>9/4/25</a:t>
             </a:fld>
             <a:endParaRPr lang="en-US"/>
           </a:p>
@@ -3333,7 +3363,7 @@
           <a:p>
             <a:fld id="{94294551-8571-4843-9360-5BE0706F1087}" type="datetime1">
               <a:rPr lang="en-US" smtClean="0"/>
-              <a:t>8/28/25</a:t>
+              <a:t>9/4/25</a:t>
             </a:fld>
             <a:endParaRPr lang="en-US"/>
           </a:p>
@@ -3577,7 +3607,7 @@
           <a:p>
             <a:fld id="{966DDEE6-831A-1840-B23B-63315631BC70}" type="datetime1">
               <a:rPr lang="en-US" smtClean="0"/>
-              <a:t>8/28/25</a:t>
+              <a:t>9/4/25</a:t>
             </a:fld>
             <a:endParaRPr lang="en-US"/>
           </a:p>
@@ -4162,7 +4192,7 @@
           <p:nvPr>
             <p:extLst>
               <p:ext uri="{D42A27DB-BD31-4B8C-83A1-F6EECF244321}">
-                <p14:modId xmlns:p14="http://schemas.microsoft.com/office/powerpoint/2010/main" val="1940308471"/>
+                <p14:modId xmlns:p14="http://schemas.microsoft.com/office/powerpoint/2010/main" val="2146045332"/>
               </p:ext>
             </p:extLst>
           </p:nvPr>
@@ -4454,13 +4484,10 @@
                       </a:r>
                     </a:p>
                     <a:p>
-                      <a:r>
-                        <a:rPr lang="en-US" sz="1400" dirty="0">
-                          <a:latin typeface="Calibri" panose="020F0502020204030204" pitchFamily="34" charset="0"/>
-                          <a:cs typeface="Calibri" panose="020F0502020204030204" pitchFamily="34" charset="0"/>
-                        </a:rPr>
-                        <a:t>(ECD)</a:t>
-                      </a:r>
+                      <a:endParaRPr lang="en-US" sz="1400" dirty="0">
+                        <a:latin typeface="Calibri" panose="020F0502020204030204" pitchFamily="34" charset="0"/>
+                        <a:cs typeface="Calibri" panose="020F0502020204030204" pitchFamily="34" charset="0"/>
+                      </a:endParaRPr>
                     </a:p>
                   </a:txBody>
                   <a:tcPr>
@@ -5093,7 +5120,7 @@
           <p:cNvPr id="2" name="Footer Placeholder 1">
             <a:extLst>
               <a:ext uri="{FF2B5EF4-FFF2-40B4-BE49-F238E27FC236}">
-                <a16:creationId xmlns:a16="http://schemas.microsoft.com/office/drawing/2014/main" id="{0A95BD49-C58E-BE4C-47A3-E8C8C0D6FB61}"/>
+                <a16:creationId xmlns:a16="http://schemas.microsoft.com/office/drawing/2014/main" id="{CE44976F-B93B-BC7C-B7A7-7B8CC8014044}"/>
               </a:ext>
             </a:extLst>
           </p:cNvPr>
@@ -5106,8 +5133,8 @@
         </p:nvSpPr>
         <p:spPr>
           <a:xfrm>
-            <a:off x="9688825" y="6401752"/>
-            <a:ext cx="2301240" cy="365125"/>
+            <a:off x="9639290" y="6420110"/>
+            <a:ext cx="2506672" cy="365125"/>
           </a:xfrm>
         </p:spPr>
         <p:txBody>
@@ -5126,7 +5153,7 @@
           <p:cNvPr id="3" name="Slide Number Placeholder 2">
             <a:extLst>
               <a:ext uri="{FF2B5EF4-FFF2-40B4-BE49-F238E27FC236}">
-                <a16:creationId xmlns:a16="http://schemas.microsoft.com/office/drawing/2014/main" id="{B419D074-4F81-1903-CC09-2551FED7D264}"/>
+                <a16:creationId xmlns:a16="http://schemas.microsoft.com/office/drawing/2014/main" id="{8CF068EA-580D-E909-1975-5864FDA01D24}"/>
               </a:ext>
             </a:extLst>
           </p:cNvPr>
@@ -5139,7 +5166,7 @@
         </p:nvSpPr>
         <p:spPr>
           <a:xfrm>
-            <a:off x="-2347119" y="6401752"/>
+            <a:off x="-2321560" y="6401752"/>
             <a:ext cx="2743200" cy="365125"/>
           </a:xfrm>
         </p:spPr>
@@ -5160,7 +5187,7 @@
           <p:cNvPr id="4" name="Picture Placeholder 3">
             <a:extLst>
               <a:ext uri="{FF2B5EF4-FFF2-40B4-BE49-F238E27FC236}">
-                <a16:creationId xmlns:a16="http://schemas.microsoft.com/office/drawing/2014/main" id="{55E2DDBC-3936-219E-5A7F-6DA09C130C8B}"/>
+                <a16:creationId xmlns:a16="http://schemas.microsoft.com/office/drawing/2014/main" id="{0BA246BE-91BE-5E02-4561-F2FCA2179CFB}"/>
               </a:ext>
             </a:extLst>
           </p:cNvPr>
@@ -5178,7 +5205,7 @@
           <p:cNvPr id="5" name="Picture Placeholder 4">
             <a:extLst>
               <a:ext uri="{FF2B5EF4-FFF2-40B4-BE49-F238E27FC236}">
-                <a16:creationId xmlns:a16="http://schemas.microsoft.com/office/drawing/2014/main" id="{030EFC86-24E5-E369-68B1-BE93F7ADE037}"/>
+                <a16:creationId xmlns:a16="http://schemas.microsoft.com/office/drawing/2014/main" id="{7BA0A6AB-93D5-EA49-D556-C647D4E5F3D6}"/>
               </a:ext>
             </a:extLst>
           </p:cNvPr>
@@ -5196,7 +5223,7 @@
           <p:cNvPr id="6" name="Picture Placeholder 5">
             <a:extLst>
               <a:ext uri="{FF2B5EF4-FFF2-40B4-BE49-F238E27FC236}">
-                <a16:creationId xmlns:a16="http://schemas.microsoft.com/office/drawing/2014/main" id="{A09A835E-C928-9748-0F68-1390279FBE15}"/>
+                <a16:creationId xmlns:a16="http://schemas.microsoft.com/office/drawing/2014/main" id="{631A860E-904C-3522-6DD4-3677C102DF97}"/>
               </a:ext>
             </a:extLst>
           </p:cNvPr>
@@ -5211,287 +5238,28 @@
       </p:sp>
       <p:sp>
         <p:nvSpPr>
-          <p:cNvPr id="7" name="Title 1">
-            <a:extLst>
-              <a:ext uri="{FF2B5EF4-FFF2-40B4-BE49-F238E27FC236}">
-                <a16:creationId xmlns:a16="http://schemas.microsoft.com/office/drawing/2014/main" id="{92FE2D43-E158-F720-0033-1B243AB86EC6}"/>
-              </a:ext>
-            </a:extLst>
-          </p:cNvPr>
-          <p:cNvSpPr txBox="1">
-            <a:spLocks/>
-          </p:cNvSpPr>
-          <p:nvPr/>
-        </p:nvSpPr>
-        <p:spPr>
-          <a:xfrm>
-            <a:off x="157480" y="273685"/>
-            <a:ext cx="10515600" cy="549275"/>
-          </a:xfrm>
-          <a:prstGeom prst="rect">
-            <a:avLst/>
-          </a:prstGeom>
-        </p:spPr>
-        <p:txBody>
-          <a:bodyPr vert="horz" lIns="91440" tIns="45720" rIns="91440" bIns="45720" rtlCol="0" anchor="b">
-            <a:normAutofit/>
-          </a:bodyPr>
-          <a:lstStyle>
-            <a:lvl1pPr algn="l" defTabSz="914400" rtl="0" eaLnBrk="1" latinLnBrk="0" hangingPunct="1">
-              <a:lnSpc>
-                <a:spcPct val="90000"/>
-              </a:lnSpc>
-              <a:spcBef>
-                <a:spcPct val="0"/>
-              </a:spcBef>
-              <a:buNone/>
-              <a:defRPr sz="3200" kern="1200">
-                <a:solidFill>
-                  <a:schemeClr val="tx1"/>
-                </a:solidFill>
-                <a:latin typeface="+mj-lt"/>
-                <a:ea typeface="+mj-ea"/>
-                <a:cs typeface="+mj-cs"/>
-              </a:defRPr>
-            </a:lvl1pPr>
-          </a:lstStyle>
-          <a:p>
-            <a:r>
-              <a:rPr lang="en-US" sz="2800" b="1" dirty="0">
-                <a:latin typeface="+mn-lt"/>
-              </a:rPr>
-              <a:t>Seq Alignment</a:t>
-            </a:r>
-          </a:p>
-        </p:txBody>
-      </p:sp>
-      <p:sp>
-        <p:nvSpPr>
-          <p:cNvPr id="8" name="Slide Number Placeholder 2">
-            <a:extLst>
-              <a:ext uri="{FF2B5EF4-FFF2-40B4-BE49-F238E27FC236}">
-                <a16:creationId xmlns:a16="http://schemas.microsoft.com/office/drawing/2014/main" id="{A6F0C3B4-5EE7-E331-1472-14ADC0D217F3}"/>
-              </a:ext>
-            </a:extLst>
-          </p:cNvPr>
-          <p:cNvSpPr txBox="1">
-            <a:spLocks/>
-          </p:cNvSpPr>
-          <p:nvPr/>
-        </p:nvSpPr>
-        <p:spPr>
-          <a:xfrm>
-            <a:off x="421640" y="6401752"/>
-            <a:ext cx="3017520" cy="365125"/>
-          </a:xfrm>
-          <a:prstGeom prst="rect">
-            <a:avLst/>
-          </a:prstGeom>
-          <a:ln>
-            <a:solidFill>
-              <a:schemeClr val="tx1"/>
-            </a:solidFill>
-            <a:prstDash val="sysDot"/>
-          </a:ln>
-        </p:spPr>
-        <p:txBody>
-          <a:bodyPr vert="horz" lIns="91440" tIns="45720" rIns="91440" bIns="45720" rtlCol="0" anchor="ctr"/>
-          <a:lstStyle>
-            <a:defPPr>
-              <a:defRPr lang="en-US"/>
-            </a:defPPr>
-            <a:lvl1pPr marL="0" algn="r" defTabSz="914400" rtl="0" eaLnBrk="1" latinLnBrk="0" hangingPunct="1">
-              <a:defRPr sz="1200" kern="1200">
-                <a:solidFill>
-                  <a:schemeClr val="tx1">
-                    <a:tint val="75000"/>
-                  </a:schemeClr>
-                </a:solidFill>
-                <a:latin typeface="+mn-lt"/>
-                <a:ea typeface="+mn-ea"/>
-                <a:cs typeface="+mn-cs"/>
-              </a:defRPr>
-            </a:lvl1pPr>
-            <a:lvl2pPr marL="457200" algn="l" defTabSz="914400" rtl="0" eaLnBrk="1" latinLnBrk="0" hangingPunct="1">
-              <a:defRPr sz="1800" kern="1200">
-                <a:solidFill>
-                  <a:schemeClr val="tx1"/>
-                </a:solidFill>
-                <a:latin typeface="+mn-lt"/>
-                <a:ea typeface="+mn-ea"/>
-                <a:cs typeface="+mn-cs"/>
-              </a:defRPr>
-            </a:lvl2pPr>
-            <a:lvl3pPr marL="914400" algn="l" defTabSz="914400" rtl="0" eaLnBrk="1" latinLnBrk="0" hangingPunct="1">
-              <a:defRPr sz="1800" kern="1200">
-                <a:solidFill>
-                  <a:schemeClr val="tx1"/>
-                </a:solidFill>
-                <a:latin typeface="+mn-lt"/>
-                <a:ea typeface="+mn-ea"/>
-                <a:cs typeface="+mn-cs"/>
-              </a:defRPr>
-            </a:lvl3pPr>
-            <a:lvl4pPr marL="1371600" algn="l" defTabSz="914400" rtl="0" eaLnBrk="1" latinLnBrk="0" hangingPunct="1">
-              <a:defRPr sz="1800" kern="1200">
-                <a:solidFill>
-                  <a:schemeClr val="tx1"/>
-                </a:solidFill>
-                <a:latin typeface="+mn-lt"/>
-                <a:ea typeface="+mn-ea"/>
-                <a:cs typeface="+mn-cs"/>
-              </a:defRPr>
-            </a:lvl4pPr>
-            <a:lvl5pPr marL="1828800" algn="l" defTabSz="914400" rtl="0" eaLnBrk="1" latinLnBrk="0" hangingPunct="1">
-              <a:defRPr sz="1800" kern="1200">
-                <a:solidFill>
-                  <a:schemeClr val="tx1"/>
-                </a:solidFill>
-                <a:latin typeface="+mn-lt"/>
-                <a:ea typeface="+mn-ea"/>
-                <a:cs typeface="+mn-cs"/>
-              </a:defRPr>
-            </a:lvl5pPr>
-            <a:lvl6pPr marL="2286000" algn="l" defTabSz="914400" rtl="0" eaLnBrk="1" latinLnBrk="0" hangingPunct="1">
-              <a:defRPr sz="1800" kern="1200">
-                <a:solidFill>
-                  <a:schemeClr val="tx1"/>
-                </a:solidFill>
-                <a:latin typeface="+mn-lt"/>
-                <a:ea typeface="+mn-ea"/>
-                <a:cs typeface="+mn-cs"/>
-              </a:defRPr>
-            </a:lvl6pPr>
-            <a:lvl7pPr marL="2743200" algn="l" defTabSz="914400" rtl="0" eaLnBrk="1" latinLnBrk="0" hangingPunct="1">
-              <a:defRPr sz="1800" kern="1200">
-                <a:solidFill>
-                  <a:schemeClr val="tx1"/>
-                </a:solidFill>
-                <a:latin typeface="+mn-lt"/>
-                <a:ea typeface="+mn-ea"/>
-                <a:cs typeface="+mn-cs"/>
-              </a:defRPr>
-            </a:lvl7pPr>
-            <a:lvl8pPr marL="3200400" algn="l" defTabSz="914400" rtl="0" eaLnBrk="1" latinLnBrk="0" hangingPunct="1">
-              <a:defRPr sz="1800" kern="1200">
-                <a:solidFill>
-                  <a:schemeClr val="tx1"/>
-                </a:solidFill>
-                <a:latin typeface="+mn-lt"/>
-                <a:ea typeface="+mn-ea"/>
-                <a:cs typeface="+mn-cs"/>
-              </a:defRPr>
-            </a:lvl8pPr>
-            <a:lvl9pPr marL="3657600" algn="l" defTabSz="914400" rtl="0" eaLnBrk="1" latinLnBrk="0" hangingPunct="1">
-              <a:defRPr sz="1800" kern="1200">
-                <a:solidFill>
-                  <a:schemeClr val="tx1"/>
-                </a:solidFill>
-                <a:latin typeface="+mn-lt"/>
-                <a:ea typeface="+mn-ea"/>
-                <a:cs typeface="+mn-cs"/>
-              </a:defRPr>
-            </a:lvl9pPr>
-          </a:lstStyle>
-          <a:p>
-            <a:r>
-              <a:rPr lang="en-US" dirty="0">
-                <a:latin typeface="Calibri" panose="020F0502020204030204" pitchFamily="34" charset="0"/>
-                <a:cs typeface="Calibri" panose="020F0502020204030204" pitchFamily="34" charset="0"/>
-              </a:rPr>
-              <a:t>Private and confidential. For internal use only.</a:t>
-            </a:r>
-          </a:p>
-        </p:txBody>
-      </p:sp>
-      <p:sp>
-        <p:nvSpPr>
-          <p:cNvPr id="9" name="TextBox 8">
-            <a:extLst>
-              <a:ext uri="{FF2B5EF4-FFF2-40B4-BE49-F238E27FC236}">
-                <a16:creationId xmlns:a16="http://schemas.microsoft.com/office/drawing/2014/main" id="{1698D341-7E42-1398-82E1-3075E2DE87A2}"/>
-              </a:ext>
-            </a:extLst>
-          </p:cNvPr>
-          <p:cNvSpPr txBox="1"/>
-          <p:nvPr/>
-        </p:nvSpPr>
-        <p:spPr>
-          <a:xfrm>
-            <a:off x="6635114" y="5405120"/>
-            <a:ext cx="2092326" cy="523220"/>
-          </a:xfrm>
-          <a:prstGeom prst="rect">
-            <a:avLst/>
-          </a:prstGeom>
-          <a:noFill/>
-        </p:spPr>
-        <p:txBody>
-          <a:bodyPr wrap="square" rtlCol="0">
-            <a:spAutoFit/>
-          </a:bodyPr>
-          <a:lstStyle/>
-          <a:p>
-            <a:r>
-              <a:rPr lang="en-US" sz="1400" dirty="0"/>
-              <a:t>Caption</a:t>
-            </a:r>
-          </a:p>
-          <a:p>
-            <a:r>
-              <a:rPr lang="en-US" sz="1400" dirty="0"/>
-              <a:t>RMSD</a:t>
-            </a:r>
-          </a:p>
-        </p:txBody>
-      </p:sp>
-      <p:sp>
-        <p:nvSpPr>
-          <p:cNvPr id="10" name="TextBox 9">
-            <a:extLst>
-              <a:ext uri="{FF2B5EF4-FFF2-40B4-BE49-F238E27FC236}">
-                <a16:creationId xmlns:a16="http://schemas.microsoft.com/office/drawing/2014/main" id="{48E13003-908E-E3CB-003C-4432E4BB39A2}"/>
-              </a:ext>
-            </a:extLst>
-          </p:cNvPr>
-          <p:cNvSpPr txBox="1"/>
-          <p:nvPr/>
-        </p:nvSpPr>
-        <p:spPr>
-          <a:xfrm>
-            <a:off x="9378313" y="5405120"/>
-            <a:ext cx="2092326" cy="523220"/>
-          </a:xfrm>
-          <a:prstGeom prst="rect">
-            <a:avLst/>
-          </a:prstGeom>
-          <a:noFill/>
-        </p:spPr>
-        <p:txBody>
-          <a:bodyPr wrap="square" rtlCol="0">
-            <a:spAutoFit/>
-          </a:bodyPr>
-          <a:lstStyle/>
-          <a:p>
-            <a:r>
-              <a:rPr lang="en-US" sz="1400" dirty="0"/>
-              <a:t>Caption</a:t>
-            </a:r>
-          </a:p>
-          <a:p>
-            <a:r>
-              <a:rPr lang="en-US" sz="1400" dirty="0"/>
-              <a:t>RMSD</a:t>
-            </a:r>
-          </a:p>
-        </p:txBody>
+          <p:cNvPr id="7" name="Picture Placeholder 6">
+            <a:extLst>
+              <a:ext uri="{FF2B5EF4-FFF2-40B4-BE49-F238E27FC236}">
+                <a16:creationId xmlns:a16="http://schemas.microsoft.com/office/drawing/2014/main" id="{53E3C8DF-D84B-4322-4746-E322E4E37A93}"/>
+              </a:ext>
+            </a:extLst>
+          </p:cNvPr>
+          <p:cNvSpPr>
+            <a:spLocks noGrp="1"/>
+          </p:cNvSpPr>
+          <p:nvPr>
+            <p:ph type="pic" sz="quarter" idx="16"/>
+          </p:nvPr>
+        </p:nvSpPr>
+        <p:spPr/>
       </p:sp>
       <p:graphicFrame>
         <p:nvGraphicFramePr>
-          <p:cNvPr id="11" name="Table 11">
-            <a:extLst>
-              <a:ext uri="{FF2B5EF4-FFF2-40B4-BE49-F238E27FC236}">
-                <a16:creationId xmlns:a16="http://schemas.microsoft.com/office/drawing/2014/main" id="{FE17381C-10F0-7D10-717F-D85898436C91}"/>
+          <p:cNvPr id="8" name="Table 11">
+            <a:extLst>
+              <a:ext uri="{FF2B5EF4-FFF2-40B4-BE49-F238E27FC236}">
+                <a16:creationId xmlns:a16="http://schemas.microsoft.com/office/drawing/2014/main" id="{DBF27CDD-852C-001C-4687-381A4204FF4D}"/>
               </a:ext>
             </a:extLst>
           </p:cNvPr>
@@ -5501,14 +5269,14 @@
           <p:nvPr>
             <p:extLst>
               <p:ext uri="{D42A27DB-BD31-4B8C-83A1-F6EECF244321}">
-                <p14:modId xmlns:p14="http://schemas.microsoft.com/office/powerpoint/2010/main" val="1932480188"/>
+                <p14:modId xmlns:p14="http://schemas.microsoft.com/office/powerpoint/2010/main" val="3081202271"/>
               </p:ext>
             </p:extLst>
           </p:nvPr>
         </p:nvGraphicFramePr>
         <p:xfrm>
-          <a:off x="347591" y="4193080"/>
-          <a:ext cx="5195272" cy="2160871"/>
+          <a:off x="189529" y="4717062"/>
+          <a:ext cx="5195272" cy="1547147"/>
         </p:xfrm>
         <a:graphic>
           <a:graphicData uri="http://schemas.openxmlformats.org/drawingml/2006/table">
@@ -5572,8 +5340,12 @@
                     <a:lstStyle/>
                     <a:p>
                       <a:r>
+                        <a:rPr lang="en-US" sz="1400"/>
+                        <a:t>% </a:t>
+                      </a:r>
+                      <a:r>
                         <a:rPr lang="en-US" sz="1400" dirty="0"/>
-                        <a:t>ECD % Identity to Human</a:t>
+                        <a:t>Identity to Human</a:t>
                       </a:r>
                     </a:p>
                   </a:txBody>
@@ -5739,90 +5511,154 @@
                   </a:ext>
                 </a:extLst>
               </a:tr>
-              <a:tr h="306862">
-                <a:tc>
-                  <a:txBody>
-                    <a:bodyPr/>
-                    <a:lstStyle/>
-                    <a:p>
-                      <a:endParaRPr lang="en-US" sz="1400" dirty="0"/>
-                    </a:p>
-                  </a:txBody>
-                  <a:tcPr/>
-                </a:tc>
-                <a:tc>
-                  <a:txBody>
-                    <a:bodyPr/>
-                    <a:lstStyle/>
-                    <a:p>
-                      <a:endParaRPr lang="en-US" sz="1400" dirty="0"/>
-                    </a:p>
-                  </a:txBody>
-                  <a:tcPr/>
-                </a:tc>
-                <a:tc>
-                  <a:txBody>
-                    <a:bodyPr/>
-                    <a:lstStyle/>
-                    <a:p>
-                      <a:endParaRPr lang="en-US" sz="1400" dirty="0"/>
-                    </a:p>
-                  </a:txBody>
-                  <a:tcPr/>
-                </a:tc>
-                <a:extLst>
-                  <a:ext uri="{0D108BD9-81ED-4DB2-BD59-A6C34878D82A}">
-                    <a16:rowId xmlns:a16="http://schemas.microsoft.com/office/drawing/2014/main" val="2746488487"/>
-                  </a:ext>
-                </a:extLst>
-              </a:tr>
-              <a:tr h="306862">
-                <a:tc>
-                  <a:txBody>
-                    <a:bodyPr/>
-                    <a:lstStyle/>
-                    <a:p>
-                      <a:endParaRPr lang="en-US" sz="1400" dirty="0"/>
-                    </a:p>
-                  </a:txBody>
-                  <a:tcPr/>
-                </a:tc>
-                <a:tc>
-                  <a:txBody>
-                    <a:bodyPr/>
-                    <a:lstStyle/>
-                    <a:p>
-                      <a:endParaRPr lang="en-US" sz="1400" dirty="0"/>
-                    </a:p>
-                  </a:txBody>
-                  <a:tcPr/>
-                </a:tc>
-                <a:tc>
-                  <a:txBody>
-                    <a:bodyPr/>
-                    <a:lstStyle/>
-                    <a:p>
-                      <a:endParaRPr lang="en-US" sz="1400" dirty="0"/>
-                    </a:p>
-                  </a:txBody>
-                  <a:tcPr/>
-                </a:tc>
-                <a:extLst>
-                  <a:ext uri="{0D108BD9-81ED-4DB2-BD59-A6C34878D82A}">
-                    <a16:rowId xmlns:a16="http://schemas.microsoft.com/office/drawing/2014/main" val="1433369731"/>
-                  </a:ext>
-                </a:extLst>
-              </a:tr>
             </a:tbl>
           </a:graphicData>
         </a:graphic>
       </p:graphicFrame>
       <p:sp>
         <p:nvSpPr>
+          <p:cNvPr id="9" name="Title 1">
+            <a:extLst>
+              <a:ext uri="{FF2B5EF4-FFF2-40B4-BE49-F238E27FC236}">
+                <a16:creationId xmlns:a16="http://schemas.microsoft.com/office/drawing/2014/main" id="{28B850C4-AA82-22AB-888D-648222FCC073}"/>
+              </a:ext>
+            </a:extLst>
+          </p:cNvPr>
+          <p:cNvSpPr txBox="1">
+            <a:spLocks/>
+          </p:cNvSpPr>
+          <p:nvPr/>
+        </p:nvSpPr>
+        <p:spPr>
+          <a:xfrm>
+            <a:off x="157480" y="273685"/>
+            <a:ext cx="10515600" cy="549275"/>
+          </a:xfrm>
+          <a:prstGeom prst="rect">
+            <a:avLst/>
+          </a:prstGeom>
+        </p:spPr>
+        <p:txBody>
+          <a:bodyPr vert="horz" lIns="91440" tIns="45720" rIns="91440" bIns="45720" rtlCol="0" anchor="b">
+            <a:normAutofit/>
+          </a:bodyPr>
+          <a:lstStyle>
+            <a:lvl1pPr algn="l" defTabSz="914400" rtl="0" eaLnBrk="1" latinLnBrk="0" hangingPunct="1">
+              <a:lnSpc>
+                <a:spcPct val="90000"/>
+              </a:lnSpc>
+              <a:spcBef>
+                <a:spcPct val="0"/>
+              </a:spcBef>
+              <a:buNone/>
+              <a:defRPr sz="3200" kern="1200">
+                <a:solidFill>
+                  <a:schemeClr val="tx1"/>
+                </a:solidFill>
+                <a:latin typeface="+mj-lt"/>
+                <a:ea typeface="+mj-ea"/>
+                <a:cs typeface="+mj-cs"/>
+              </a:defRPr>
+            </a:lvl1pPr>
+          </a:lstStyle>
+          <a:p>
+            <a:r>
+              <a:rPr lang="en-US" sz="2800" b="1" dirty="0">
+                <a:latin typeface="+mn-lt"/>
+              </a:rPr>
+              <a:t>Seq Alignment</a:t>
+            </a:r>
+          </a:p>
+        </p:txBody>
+      </p:sp>
+      <p:sp>
+        <p:nvSpPr>
+          <p:cNvPr id="10" name="TextBox 9">
+            <a:extLst>
+              <a:ext uri="{FF2B5EF4-FFF2-40B4-BE49-F238E27FC236}">
+                <a16:creationId xmlns:a16="http://schemas.microsoft.com/office/drawing/2014/main" id="{F27F7027-A04D-55C8-8F1D-74EE28CC88D1}"/>
+              </a:ext>
+            </a:extLst>
+          </p:cNvPr>
+          <p:cNvSpPr txBox="1"/>
+          <p:nvPr/>
+        </p:nvSpPr>
+        <p:spPr>
+          <a:xfrm>
+            <a:off x="6421120" y="3440187"/>
+            <a:ext cx="2092326" cy="523220"/>
+          </a:xfrm>
+          <a:prstGeom prst="rect">
+            <a:avLst/>
+          </a:prstGeom>
+          <a:noFill/>
+        </p:spPr>
+        <p:txBody>
+          <a:bodyPr wrap="square" rtlCol="0">
+            <a:spAutoFit/>
+          </a:bodyPr>
+          <a:lstStyle/>
+          <a:p>
+            <a:r>
+              <a:rPr lang="en-US" sz="1400" dirty="0"/>
+              <a:t>Caption</a:t>
+            </a:r>
+          </a:p>
+          <a:p>
+            <a:r>
+              <a:rPr lang="en-US" sz="1400" dirty="0"/>
+              <a:t>RMSD</a:t>
+            </a:r>
+          </a:p>
+        </p:txBody>
+      </p:sp>
+      <p:sp>
+        <p:nvSpPr>
+          <p:cNvPr id="11" name="TextBox 10">
+            <a:extLst>
+              <a:ext uri="{FF2B5EF4-FFF2-40B4-BE49-F238E27FC236}">
+                <a16:creationId xmlns:a16="http://schemas.microsoft.com/office/drawing/2014/main" id="{5081264D-9E52-A65A-604E-3C87C6A51409}"/>
+              </a:ext>
+            </a:extLst>
+          </p:cNvPr>
+          <p:cNvSpPr txBox="1"/>
+          <p:nvPr/>
+        </p:nvSpPr>
+        <p:spPr>
+          <a:xfrm>
+            <a:off x="10931369" y="3440187"/>
+            <a:ext cx="2092326" cy="523220"/>
+          </a:xfrm>
+          <a:prstGeom prst="rect">
+            <a:avLst/>
+          </a:prstGeom>
+          <a:noFill/>
+        </p:spPr>
+        <p:txBody>
+          <a:bodyPr wrap="square" rtlCol="0">
+            <a:spAutoFit/>
+          </a:bodyPr>
+          <a:lstStyle/>
+          <a:p>
+            <a:r>
+              <a:rPr lang="en-US" sz="1400" dirty="0"/>
+              <a:t>Caption</a:t>
+            </a:r>
+          </a:p>
+          <a:p>
+            <a:r>
+              <a:rPr lang="en-US" sz="1400" dirty="0"/>
+              <a:t>RMSD</a:t>
+            </a:r>
+          </a:p>
+        </p:txBody>
+      </p:sp>
+      <p:sp>
+        <p:nvSpPr>
           <p:cNvPr id="12" name="Rectangle 11">
             <a:extLst>
               <a:ext uri="{FF2B5EF4-FFF2-40B4-BE49-F238E27FC236}">
-                <a16:creationId xmlns:a16="http://schemas.microsoft.com/office/drawing/2014/main" id="{EA40172E-85A3-B9EF-4E81-B8F4E2EC07BC}"/>
+                <a16:creationId xmlns:a16="http://schemas.microsoft.com/office/drawing/2014/main" id="{4070FB0A-0576-F4A6-0C73-6831E5CE6948}"/>
               </a:ext>
             </a:extLst>
           </p:cNvPr>
@@ -5831,7 +5667,7 @@
         </p:nvSpPr>
         <p:spPr>
           <a:xfrm>
-            <a:off x="6756400" y="5928340"/>
+            <a:off x="6542406" y="3963407"/>
             <a:ext cx="213360" cy="198140"/>
           </a:xfrm>
           <a:prstGeom prst="rect">
@@ -5871,7 +5707,7 @@
           <p:cNvPr id="13" name="TextBox 12">
             <a:extLst>
               <a:ext uri="{FF2B5EF4-FFF2-40B4-BE49-F238E27FC236}">
-                <a16:creationId xmlns:a16="http://schemas.microsoft.com/office/drawing/2014/main" id="{9A719C7D-8D24-F84B-AC45-BE66307B2A18}"/>
+                <a16:creationId xmlns:a16="http://schemas.microsoft.com/office/drawing/2014/main" id="{DBF587EB-7892-2DE2-9BD6-E78C7792E955}"/>
               </a:ext>
             </a:extLst>
           </p:cNvPr>
@@ -5880,7 +5716,7 @@
         </p:nvSpPr>
         <p:spPr>
           <a:xfrm>
-            <a:off x="6960550" y="5871962"/>
+            <a:off x="6746556" y="3907029"/>
             <a:ext cx="2092326" cy="310896"/>
           </a:xfrm>
           <a:prstGeom prst="rect">
@@ -5906,7 +5742,7 @@
           <p:cNvPr id="14" name="Rectangle 13">
             <a:extLst>
               <a:ext uri="{FF2B5EF4-FFF2-40B4-BE49-F238E27FC236}">
-                <a16:creationId xmlns:a16="http://schemas.microsoft.com/office/drawing/2014/main" id="{6BED6B50-A328-EBB0-121B-EA456F5DE8C6}"/>
+                <a16:creationId xmlns:a16="http://schemas.microsoft.com/office/drawing/2014/main" id="{9E20709F-A0B0-C984-9B2B-D957606F71BA}"/>
               </a:ext>
             </a:extLst>
           </p:cNvPr>
@@ -5915,7 +5751,7 @@
         </p:nvSpPr>
         <p:spPr>
           <a:xfrm>
-            <a:off x="9532610" y="5928340"/>
+            <a:off x="11085666" y="3963407"/>
             <a:ext cx="213360" cy="198140"/>
           </a:xfrm>
           <a:prstGeom prst="rect">
@@ -5955,7 +5791,7 @@
           <p:cNvPr id="15" name="TextBox 14">
             <a:extLst>
               <a:ext uri="{FF2B5EF4-FFF2-40B4-BE49-F238E27FC236}">
-                <a16:creationId xmlns:a16="http://schemas.microsoft.com/office/drawing/2014/main" id="{D98F3D2A-C3B8-A7C0-801C-77EE3FDB56F4}"/>
+                <a16:creationId xmlns:a16="http://schemas.microsoft.com/office/drawing/2014/main" id="{F4F8DDCE-F9EF-8DF4-DE5B-558AD8245047}"/>
               </a:ext>
             </a:extLst>
           </p:cNvPr>
@@ -5964,7 +5800,7 @@
         </p:nvSpPr>
         <p:spPr>
           <a:xfrm>
-            <a:off x="9718654" y="5872279"/>
+            <a:off x="11271710" y="3907346"/>
             <a:ext cx="2092326" cy="310896"/>
           </a:xfrm>
           <a:prstGeom prst="rect">
@@ -5985,10 +5821,274 @@
           </a:p>
         </p:txBody>
       </p:sp>
+      <p:sp>
+        <p:nvSpPr>
+          <p:cNvPr id="16" name="Slide Number Placeholder 2">
+            <a:extLst>
+              <a:ext uri="{FF2B5EF4-FFF2-40B4-BE49-F238E27FC236}">
+                <a16:creationId xmlns:a16="http://schemas.microsoft.com/office/drawing/2014/main" id="{10CAE1C2-FAD4-1786-B25A-168A20CF1062}"/>
+              </a:ext>
+            </a:extLst>
+          </p:cNvPr>
+          <p:cNvSpPr txBox="1">
+            <a:spLocks/>
+          </p:cNvSpPr>
+          <p:nvPr/>
+        </p:nvSpPr>
+        <p:spPr>
+          <a:xfrm>
+            <a:off x="421640" y="6401752"/>
+            <a:ext cx="3017520" cy="365125"/>
+          </a:xfrm>
+          <a:prstGeom prst="rect">
+            <a:avLst/>
+          </a:prstGeom>
+          <a:ln>
+            <a:solidFill>
+              <a:schemeClr val="tx1"/>
+            </a:solidFill>
+            <a:prstDash val="sysDot"/>
+          </a:ln>
+        </p:spPr>
+        <p:txBody>
+          <a:bodyPr vert="horz" lIns="91440" tIns="45720" rIns="91440" bIns="45720" rtlCol="0" anchor="ctr"/>
+          <a:lstStyle>
+            <a:defPPr>
+              <a:defRPr lang="en-US"/>
+            </a:defPPr>
+            <a:lvl1pPr marL="0" algn="r" defTabSz="914400" rtl="0" eaLnBrk="1" latinLnBrk="0" hangingPunct="1">
+              <a:defRPr sz="1200" kern="1200">
+                <a:solidFill>
+                  <a:schemeClr val="tx1">
+                    <a:tint val="75000"/>
+                  </a:schemeClr>
+                </a:solidFill>
+                <a:latin typeface="+mn-lt"/>
+                <a:ea typeface="+mn-ea"/>
+                <a:cs typeface="+mn-cs"/>
+              </a:defRPr>
+            </a:lvl1pPr>
+            <a:lvl2pPr marL="457200" algn="l" defTabSz="914400" rtl="0" eaLnBrk="1" latinLnBrk="0" hangingPunct="1">
+              <a:defRPr sz="1800" kern="1200">
+                <a:solidFill>
+                  <a:schemeClr val="tx1"/>
+                </a:solidFill>
+                <a:latin typeface="+mn-lt"/>
+                <a:ea typeface="+mn-ea"/>
+                <a:cs typeface="+mn-cs"/>
+              </a:defRPr>
+            </a:lvl2pPr>
+            <a:lvl3pPr marL="914400" algn="l" defTabSz="914400" rtl="0" eaLnBrk="1" latinLnBrk="0" hangingPunct="1">
+              <a:defRPr sz="1800" kern="1200">
+                <a:solidFill>
+                  <a:schemeClr val="tx1"/>
+                </a:solidFill>
+                <a:latin typeface="+mn-lt"/>
+                <a:ea typeface="+mn-ea"/>
+                <a:cs typeface="+mn-cs"/>
+              </a:defRPr>
+            </a:lvl3pPr>
+            <a:lvl4pPr marL="1371600" algn="l" defTabSz="914400" rtl="0" eaLnBrk="1" latinLnBrk="0" hangingPunct="1">
+              <a:defRPr sz="1800" kern="1200">
+                <a:solidFill>
+                  <a:schemeClr val="tx1"/>
+                </a:solidFill>
+                <a:latin typeface="+mn-lt"/>
+                <a:ea typeface="+mn-ea"/>
+                <a:cs typeface="+mn-cs"/>
+              </a:defRPr>
+            </a:lvl4pPr>
+            <a:lvl5pPr marL="1828800" algn="l" defTabSz="914400" rtl="0" eaLnBrk="1" latinLnBrk="0" hangingPunct="1">
+              <a:defRPr sz="1800" kern="1200">
+                <a:solidFill>
+                  <a:schemeClr val="tx1"/>
+                </a:solidFill>
+                <a:latin typeface="+mn-lt"/>
+                <a:ea typeface="+mn-ea"/>
+                <a:cs typeface="+mn-cs"/>
+              </a:defRPr>
+            </a:lvl5pPr>
+            <a:lvl6pPr marL="2286000" algn="l" defTabSz="914400" rtl="0" eaLnBrk="1" latinLnBrk="0" hangingPunct="1">
+              <a:defRPr sz="1800" kern="1200">
+                <a:solidFill>
+                  <a:schemeClr val="tx1"/>
+                </a:solidFill>
+                <a:latin typeface="+mn-lt"/>
+                <a:ea typeface="+mn-ea"/>
+                <a:cs typeface="+mn-cs"/>
+              </a:defRPr>
+            </a:lvl6pPr>
+            <a:lvl7pPr marL="2743200" algn="l" defTabSz="914400" rtl="0" eaLnBrk="1" latinLnBrk="0" hangingPunct="1">
+              <a:defRPr sz="1800" kern="1200">
+                <a:solidFill>
+                  <a:schemeClr val="tx1"/>
+                </a:solidFill>
+                <a:latin typeface="+mn-lt"/>
+                <a:ea typeface="+mn-ea"/>
+                <a:cs typeface="+mn-cs"/>
+              </a:defRPr>
+            </a:lvl7pPr>
+            <a:lvl8pPr marL="3200400" algn="l" defTabSz="914400" rtl="0" eaLnBrk="1" latinLnBrk="0" hangingPunct="1">
+              <a:defRPr sz="1800" kern="1200">
+                <a:solidFill>
+                  <a:schemeClr val="tx1"/>
+                </a:solidFill>
+                <a:latin typeface="+mn-lt"/>
+                <a:ea typeface="+mn-ea"/>
+                <a:cs typeface="+mn-cs"/>
+              </a:defRPr>
+            </a:lvl8pPr>
+            <a:lvl9pPr marL="3657600" algn="l" defTabSz="914400" rtl="0" eaLnBrk="1" latinLnBrk="0" hangingPunct="1">
+              <a:defRPr sz="1800" kern="1200">
+                <a:solidFill>
+                  <a:schemeClr val="tx1"/>
+                </a:solidFill>
+                <a:latin typeface="+mn-lt"/>
+                <a:ea typeface="+mn-ea"/>
+                <a:cs typeface="+mn-cs"/>
+              </a:defRPr>
+            </a:lvl9pPr>
+          </a:lstStyle>
+          <a:p>
+            <a:r>
+              <a:rPr lang="en-US" dirty="0">
+                <a:latin typeface="Calibri" panose="020F0502020204030204" pitchFamily="34" charset="0"/>
+                <a:cs typeface="Calibri" panose="020F0502020204030204" pitchFamily="34" charset="0"/>
+              </a:rPr>
+              <a:t>Private and confidential. For internal use only.</a:t>
+            </a:r>
+          </a:p>
+        </p:txBody>
+      </p:sp>
+      <p:sp>
+        <p:nvSpPr>
+          <p:cNvPr id="17" name="TextBox 16">
+            <a:extLst>
+              <a:ext uri="{FF2B5EF4-FFF2-40B4-BE49-F238E27FC236}">
+                <a16:creationId xmlns:a16="http://schemas.microsoft.com/office/drawing/2014/main" id="{7B1E804D-B855-63B3-EDDA-C54158AC809B}"/>
+              </a:ext>
+            </a:extLst>
+          </p:cNvPr>
+          <p:cNvSpPr txBox="1"/>
+          <p:nvPr/>
+        </p:nvSpPr>
+        <p:spPr>
+          <a:xfrm>
+            <a:off x="10667682" y="5636784"/>
+            <a:ext cx="2092326" cy="523220"/>
+          </a:xfrm>
+          <a:prstGeom prst="rect">
+            <a:avLst/>
+          </a:prstGeom>
+          <a:noFill/>
+        </p:spPr>
+        <p:txBody>
+          <a:bodyPr wrap="square" rtlCol="0">
+            <a:spAutoFit/>
+          </a:bodyPr>
+          <a:lstStyle/>
+          <a:p>
+            <a:r>
+              <a:rPr lang="en-US" sz="1400" dirty="0"/>
+              <a:t>Caption</a:t>
+            </a:r>
+          </a:p>
+          <a:p>
+            <a:r>
+              <a:rPr lang="en-US" sz="1400" dirty="0"/>
+              <a:t>RMSD</a:t>
+            </a:r>
+          </a:p>
+        </p:txBody>
+      </p:sp>
+      <p:sp>
+        <p:nvSpPr>
+          <p:cNvPr id="18" name="Rectangle 17">
+            <a:extLst>
+              <a:ext uri="{FF2B5EF4-FFF2-40B4-BE49-F238E27FC236}">
+                <a16:creationId xmlns:a16="http://schemas.microsoft.com/office/drawing/2014/main" id="{60BAEE60-722D-D98A-CBF2-01843922722E}"/>
+              </a:ext>
+            </a:extLst>
+          </p:cNvPr>
+          <p:cNvSpPr/>
+          <p:nvPr/>
+        </p:nvSpPr>
+        <p:spPr>
+          <a:xfrm>
+            <a:off x="10821979" y="6160004"/>
+            <a:ext cx="213360" cy="198140"/>
+          </a:xfrm>
+          <a:prstGeom prst="rect">
+            <a:avLst/>
+          </a:prstGeom>
+          <a:solidFill>
+            <a:srgbClr val="00E301"/>
+          </a:solidFill>
+        </p:spPr>
+        <p:style>
+          <a:lnRef idx="2">
+            <a:schemeClr val="accent1">
+              <a:shade val="50000"/>
+            </a:schemeClr>
+          </a:lnRef>
+          <a:fillRef idx="1">
+            <a:schemeClr val="accent1"/>
+          </a:fillRef>
+          <a:effectRef idx="0">
+            <a:schemeClr val="accent1"/>
+          </a:effectRef>
+          <a:fontRef idx="minor">
+            <a:schemeClr val="lt1"/>
+          </a:fontRef>
+        </p:style>
+        <p:txBody>
+          <a:bodyPr rtlCol="0" anchor="ctr"/>
+          <a:lstStyle/>
+          <a:p>
+            <a:pPr algn="ctr"/>
+            <a:endParaRPr lang="en-US"/>
+          </a:p>
+        </p:txBody>
+      </p:sp>
+      <p:sp>
+        <p:nvSpPr>
+          <p:cNvPr id="19" name="TextBox 18">
+            <a:extLst>
+              <a:ext uri="{FF2B5EF4-FFF2-40B4-BE49-F238E27FC236}">
+                <a16:creationId xmlns:a16="http://schemas.microsoft.com/office/drawing/2014/main" id="{E715DF21-721D-E00C-D489-F3AE680BA3A4}"/>
+              </a:ext>
+            </a:extLst>
+          </p:cNvPr>
+          <p:cNvSpPr txBox="1"/>
+          <p:nvPr/>
+        </p:nvSpPr>
+        <p:spPr>
+          <a:xfrm>
+            <a:off x="11008023" y="6103943"/>
+            <a:ext cx="2092326" cy="310896"/>
+          </a:xfrm>
+          <a:prstGeom prst="rect">
+            <a:avLst/>
+          </a:prstGeom>
+          <a:noFill/>
+        </p:spPr>
+        <p:txBody>
+          <a:bodyPr wrap="square" rtlCol="0">
+            <a:spAutoFit/>
+          </a:bodyPr>
+          <a:lstStyle/>
+          <a:p>
+            <a:r>
+              <a:rPr lang="en-US" sz="1400" dirty="0"/>
+              <a:t>Human</a:t>
+            </a:r>
+          </a:p>
+        </p:txBody>
+      </p:sp>
     </p:spTree>
     <p:extLst>
       <p:ext uri="{BB962C8B-B14F-4D97-AF65-F5344CB8AC3E}">
-        <p14:creationId xmlns:p14="http://schemas.microsoft.com/office/powerpoint/2010/main" val="3329138345"/>
+        <p14:creationId xmlns:p14="http://schemas.microsoft.com/office/powerpoint/2010/main" val="100202423"/>
       </p:ext>
     </p:extLst>
   </p:cSld>

</xml_diff>